<commit_message>
powerpoint changes were made
</commit_message>
<xml_diff>
--- a/Cybersecurity_presentation.pptx
+++ b/Cybersecurity_presentation.pptx
@@ -3190,7 +3190,7 @@
         <p:spPr>
           <a:xfrm>
             <a:off x="360" y="3240000"/>
-            <a:ext cx="503280" cy="809280"/>
+            <a:ext cx="502560" cy="808560"/>
           </a:xfrm>
           <a:prstGeom prst="rect">
             <a:avLst/>
@@ -3221,8 +3221,8 @@
         </p:nvSpPr>
         <p:spPr>
           <a:xfrm>
-            <a:off x="719640" y="225720"/>
-            <a:ext cx="8854200" cy="946440"/>
+            <a:off x="504000" y="226080"/>
+            <a:ext cx="9072000" cy="946440"/>
           </a:xfrm>
           <a:prstGeom prst="rect">
             <a:avLst/>
@@ -3231,8 +3231,9 @@
         <p:txBody>
           <a:bodyPr lIns="0" rIns="0" tIns="0" bIns="0" anchor="ctr"/>
           <a:p>
+            <a:pPr algn="ctr"/>
             <a:r>
-              <a:rPr b="0" lang="en-US" sz="1800" spc="-1" strike="noStrike">
+              <a:rPr b="0" lang="en-US" sz="4400" spc="-1" strike="noStrike">
                 <a:solidFill>
                   <a:srgbClr val="000000"/>
                 </a:solidFill>
@@ -3245,7 +3246,7 @@
               </a:rPr>
               <a:t>Click to edit the title text format</a:t>
             </a:r>
-            <a:endParaRPr b="0" lang="en-US" sz="1800" spc="-1" strike="noStrike">
+            <a:endParaRPr b="0" lang="en-US" sz="4400" spc="-1" strike="noStrike">
               <a:solidFill>
                 <a:srgbClr val="000000"/>
               </a:solidFill>
@@ -3271,8 +3272,8 @@
         </p:nvSpPr>
         <p:spPr>
           <a:xfrm>
-            <a:off x="719640" y="1620000"/>
-            <a:ext cx="8638560" cy="3288240"/>
+            <a:off x="504000" y="1326600"/>
+            <a:ext cx="9072000" cy="3288600"/>
           </a:xfrm>
           <a:prstGeom prst="rect">
             <a:avLst/>
@@ -3293,7 +3294,7 @@
               <a:buChar char=""/>
             </a:pPr>
             <a:r>
-              <a:rPr b="0" lang="en-US" sz="1800" spc="-1" strike="noStrike">
+              <a:rPr b="0" lang="en-US" sz="3200" spc="-1" strike="noStrike">
                 <a:solidFill>
                   <a:srgbClr val="000000"/>
                 </a:solidFill>
@@ -3306,7 +3307,7 @@
               </a:rPr>
               <a:t>Click to edit the outline text format</a:t>
             </a:r>
-            <a:endParaRPr b="0" lang="en-US" sz="1800" spc="-1" strike="noStrike">
+            <a:endParaRPr b="0" lang="en-US" sz="3200" spc="-1" strike="noStrike">
               <a:solidFill>
                 <a:srgbClr val="000000"/>
               </a:solidFill>
@@ -3331,7 +3332,7 @@
               <a:buChar char=""/>
             </a:pPr>
             <a:r>
-              <a:rPr b="0" lang="en-US" sz="1800" spc="-1" strike="noStrike">
+              <a:rPr b="0" lang="en-US" sz="2800" spc="-1" strike="noStrike">
                 <a:solidFill>
                   <a:srgbClr val="000000"/>
                 </a:solidFill>
@@ -3344,7 +3345,7 @@
               </a:rPr>
               <a:t>Second Outline Level</a:t>
             </a:r>
-            <a:endParaRPr b="0" lang="en-US" sz="1800" spc="-1" strike="noStrike">
+            <a:endParaRPr b="0" lang="en-US" sz="2800" spc="-1" strike="noStrike">
               <a:solidFill>
                 <a:srgbClr val="000000"/>
               </a:solidFill>
@@ -3369,7 +3370,7 @@
               <a:buChar char=""/>
             </a:pPr>
             <a:r>
-              <a:rPr b="0" lang="en-US" sz="1800" spc="-1" strike="noStrike">
+              <a:rPr b="0" lang="en-US" sz="2400" spc="-1" strike="noStrike">
                 <a:solidFill>
                   <a:srgbClr val="000000"/>
                 </a:solidFill>
@@ -3382,7 +3383,7 @@
               </a:rPr>
               <a:t>Third Outline Level</a:t>
             </a:r>
-            <a:endParaRPr b="0" lang="en-US" sz="1800" spc="-1" strike="noStrike">
+            <a:endParaRPr b="0" lang="en-US" sz="2400" spc="-1" strike="noStrike">
               <a:solidFill>
                 <a:srgbClr val="000000"/>
               </a:solidFill>
@@ -3407,7 +3408,7 @@
               <a:buChar char=""/>
             </a:pPr>
             <a:r>
-              <a:rPr b="0" lang="en-US" sz="1800" spc="-1" strike="noStrike">
+              <a:rPr b="0" lang="en-US" sz="2000" spc="-1" strike="noStrike">
                 <a:solidFill>
                   <a:srgbClr val="000000"/>
                 </a:solidFill>
@@ -3420,7 +3421,7 @@
               </a:rPr>
               <a:t>Fourth Outline Level</a:t>
             </a:r>
-            <a:endParaRPr b="0" lang="en-US" sz="1800" spc="-1" strike="noStrike">
+            <a:endParaRPr b="0" lang="en-US" sz="2000" spc="-1" strike="noStrike">
               <a:solidFill>
                 <a:srgbClr val="000000"/>
               </a:solidFill>
@@ -3445,7 +3446,7 @@
               <a:buChar char=""/>
             </a:pPr>
             <a:r>
-              <a:rPr b="0" lang="en-US" sz="1800" spc="-1" strike="noStrike">
+              <a:rPr b="0" lang="en-US" sz="2000" spc="-1" strike="noStrike">
                 <a:solidFill>
                   <a:srgbClr val="000000"/>
                 </a:solidFill>
@@ -3458,7 +3459,7 @@
               </a:rPr>
               <a:t>Fifth Outline Level</a:t>
             </a:r>
-            <a:endParaRPr b="0" lang="en-US" sz="1800" spc="-1" strike="noStrike">
+            <a:endParaRPr b="0" lang="en-US" sz="2000" spc="-1" strike="noStrike">
               <a:solidFill>
                 <a:srgbClr val="000000"/>
               </a:solidFill>
@@ -3483,7 +3484,7 @@
               <a:buChar char=""/>
             </a:pPr>
             <a:r>
-              <a:rPr b="0" lang="en-US" sz="1800" spc="-1" strike="noStrike">
+              <a:rPr b="0" lang="en-US" sz="2000" spc="-1" strike="noStrike">
                 <a:solidFill>
                   <a:srgbClr val="000000"/>
                 </a:solidFill>
@@ -3496,7 +3497,7 @@
               </a:rPr>
               <a:t>Sixth Outline Level</a:t>
             </a:r>
-            <a:endParaRPr b="0" lang="en-US" sz="1800" spc="-1" strike="noStrike">
+            <a:endParaRPr b="0" lang="en-US" sz="2000" spc="-1" strike="noStrike">
               <a:solidFill>
                 <a:srgbClr val="000000"/>
               </a:solidFill>
@@ -3521,7 +3522,7 @@
               <a:buChar char=""/>
             </a:pPr>
             <a:r>
-              <a:rPr b="0" lang="en-US" sz="1800" spc="-1" strike="noStrike">
+              <a:rPr b="0" lang="en-US" sz="2000" spc="-1" strike="noStrike">
                 <a:solidFill>
                   <a:srgbClr val="000000"/>
                 </a:solidFill>
@@ -3534,7 +3535,7 @@
               </a:rPr>
               <a:t>Seventh Outline Level</a:t>
             </a:r>
-            <a:endParaRPr b="0" lang="en-US" sz="1800" spc="-1" strike="noStrike">
+            <a:endParaRPr b="0" lang="en-US" sz="2000" spc="-1" strike="noStrike">
               <a:solidFill>
                 <a:srgbClr val="000000"/>
               </a:solidFill>
@@ -3594,7 +3595,7 @@
         <p:spPr>
           <a:xfrm>
             <a:off x="360" y="216000"/>
-            <a:ext cx="503280" cy="809280"/>
+            <a:ext cx="502560" cy="808560"/>
           </a:xfrm>
           <a:prstGeom prst="rect">
             <a:avLst/>
@@ -3999,7 +4000,7 @@
         <p:spPr>
           <a:xfrm>
             <a:off x="791640" y="2996280"/>
-            <a:ext cx="8566560" cy="1243440"/>
+            <a:ext cx="8565840" cy="1242720"/>
           </a:xfrm>
           <a:prstGeom prst="rect">
             <a:avLst/>
@@ -4056,7 +4057,7 @@
         <p:spPr>
           <a:xfrm>
             <a:off x="791640" y="4428000"/>
-            <a:ext cx="8566560" cy="736200"/>
+            <a:ext cx="8565840" cy="735480"/>
           </a:xfrm>
           <a:prstGeom prst="rect">
             <a:avLst/>
@@ -4124,14 +4125,14 @@
       </p:grpSpPr>
       <p:sp>
         <p:nvSpPr>
-          <p:cNvPr id="80" name="TextShape 1"/>
-          <p:cNvSpPr txBox="1"/>
+          <p:cNvPr id="80" name="CustomShape 1"/>
+          <p:cNvSpPr/>
           <p:nvPr/>
         </p:nvSpPr>
         <p:spPr>
           <a:xfrm>
             <a:off x="642240" y="182880"/>
-            <a:ext cx="6581520" cy="851040"/>
+            <a:ext cx="6580800" cy="850320"/>
           </a:xfrm>
           <a:prstGeom prst="rect">
             <a:avLst/>
@@ -4141,6 +4142,12 @@
             <a:noFill/>
           </a:ln>
         </p:spPr>
+        <p:style>
+          <a:lnRef idx="0"/>
+          <a:fillRef idx="0"/>
+          <a:effectRef idx="0"/>
+          <a:fontRef idx="minor"/>
+        </p:style>
         <p:txBody>
           <a:bodyPr lIns="90000" rIns="90000" tIns="45000" bIns="45000"/>
           <a:p>
@@ -4190,14 +4197,14 @@
       </p:sp>
       <p:sp>
         <p:nvSpPr>
-          <p:cNvPr id="81" name="TextShape 2"/>
-          <p:cNvSpPr txBox="1"/>
+          <p:cNvPr id="81" name="CustomShape 2"/>
+          <p:cNvSpPr/>
           <p:nvPr/>
         </p:nvSpPr>
         <p:spPr>
           <a:xfrm>
             <a:off x="731520" y="1371600"/>
-            <a:ext cx="8686800" cy="4114800"/>
+            <a:ext cx="8686080" cy="4114080"/>
           </a:xfrm>
           <a:prstGeom prst="rect">
             <a:avLst/>
@@ -4207,6 +4214,12 @@
             <a:noFill/>
           </a:ln>
         </p:spPr>
+        <p:style>
+          <a:lnRef idx="0"/>
+          <a:fillRef idx="0"/>
+          <a:effectRef idx="0"/>
+          <a:fontRef idx="minor"/>
+        </p:style>
         <p:txBody>
           <a:bodyPr lIns="90000" rIns="90000" tIns="45000" bIns="45000"/>
           <a:p>
@@ -4305,7 +4318,7 @@
         <p:spPr>
           <a:xfrm>
             <a:off x="719640" y="225720"/>
-            <a:ext cx="8854200" cy="946440"/>
+            <a:ext cx="8853480" cy="945720"/>
           </a:xfrm>
           <a:prstGeom prst="rect">
             <a:avLst/>
@@ -4377,7 +4390,7 @@
         <p:spPr>
           <a:xfrm>
             <a:off x="719640" y="1620000"/>
-            <a:ext cx="8638560" cy="3287880"/>
+            <a:ext cx="8637840" cy="3287160"/>
           </a:xfrm>
           <a:prstGeom prst="rect">
             <a:avLst/>
@@ -4396,7 +4409,7 @@
         <p:txBody>
           <a:bodyPr lIns="0" rIns="0" tIns="0" bIns="0"/>
           <a:p>
-            <a:pPr marL="432000" indent="-323280">
+            <a:pPr marL="432000" indent="-322560">
               <a:lnSpc>
                 <a:spcPct val="100000"/>
               </a:lnSpc>
@@ -4438,7 +4451,7 @@
             </a:endParaRPr>
           </a:p>
           <a:p>
-            <a:pPr marL="432000" indent="-323280">
+            <a:pPr marL="432000" indent="-322560">
               <a:lnSpc>
                 <a:spcPct val="100000"/>
               </a:lnSpc>
@@ -4480,7 +4493,7 @@
             </a:endParaRPr>
           </a:p>
           <a:p>
-            <a:pPr marL="432000" indent="-323280">
+            <a:pPr marL="432000" indent="-322560">
               <a:lnSpc>
                 <a:spcPct val="100000"/>
               </a:lnSpc>
@@ -4602,7 +4615,7 @@
         <p:spPr>
           <a:xfrm>
             <a:off x="719640" y="225720"/>
-            <a:ext cx="8854200" cy="946440"/>
+            <a:ext cx="8853480" cy="945720"/>
           </a:xfrm>
           <a:prstGeom prst="rect">
             <a:avLst/>
@@ -4659,7 +4672,7 @@
         <p:spPr>
           <a:xfrm>
             <a:off x="719640" y="1566000"/>
-            <a:ext cx="8638560" cy="3735360"/>
+            <a:ext cx="8637840" cy="3734640"/>
           </a:xfrm>
           <a:prstGeom prst="rect">
             <a:avLst/>
@@ -4678,7 +4691,7 @@
         <p:txBody>
           <a:bodyPr lIns="0" rIns="0" tIns="0" bIns="0"/>
           <a:p>
-            <a:pPr marL="432000" indent="-323280">
+            <a:pPr marL="432000" indent="-322560">
               <a:lnSpc>
                 <a:spcPct val="100000"/>
               </a:lnSpc>
@@ -4720,7 +4733,7 @@
             </a:endParaRPr>
           </a:p>
           <a:p>
-            <a:pPr marL="432000" indent="-323280">
+            <a:pPr marL="432000" indent="-322560">
               <a:lnSpc>
                 <a:spcPct val="100000"/>
               </a:lnSpc>
@@ -4747,7 +4760,7 @@
                 <a:latin typeface="Open Sans"/>
                 <a:ea typeface="DejaVu Sans"/>
               </a:rPr>
-              <a:t>User will enter a password with an optional 2-step verification using a keyfile.</a:t>
+              <a:t>User will enter a password with an optional 2-factor verification using a keyfile.</a:t>
             </a:r>
             <a:endParaRPr b="0" lang="en-US" sz="1800" spc="-1" strike="noStrike">
               <a:solidFill>
@@ -4762,7 +4775,7 @@
             </a:endParaRPr>
           </a:p>
           <a:p>
-            <a:pPr marL="432000" indent="-323280">
+            <a:pPr marL="432000" indent="-322560">
               <a:lnSpc>
                 <a:spcPct val="100000"/>
               </a:lnSpc>
@@ -4863,7 +4876,7 @@
         <p:spPr>
           <a:xfrm>
             <a:off x="719640" y="225720"/>
-            <a:ext cx="8854200" cy="946440"/>
+            <a:ext cx="8853480" cy="945720"/>
           </a:xfrm>
           <a:prstGeom prst="rect">
             <a:avLst/>
@@ -4935,7 +4948,7 @@
         <p:spPr>
           <a:xfrm>
             <a:off x="719640" y="1620000"/>
-            <a:ext cx="8638560" cy="3287880"/>
+            <a:ext cx="8637840" cy="3287160"/>
           </a:xfrm>
           <a:prstGeom prst="rect">
             <a:avLst/>
@@ -4954,7 +4967,7 @@
         <p:txBody>
           <a:bodyPr lIns="0" rIns="0" tIns="0" bIns="0"/>
           <a:p>
-            <a:pPr marL="432000" indent="-323280">
+            <a:pPr marL="432000" indent="-322560">
               <a:lnSpc>
                 <a:spcPct val="100000"/>
               </a:lnSpc>
@@ -4996,7 +5009,7 @@
             </a:endParaRPr>
           </a:p>
           <a:p>
-            <a:pPr marL="432000" indent="-323280">
+            <a:pPr marL="432000" indent="-322560">
               <a:lnSpc>
                 <a:spcPct val="100000"/>
               </a:lnSpc>
@@ -5023,7 +5036,7 @@
                 <a:latin typeface="Open Sans"/>
                 <a:ea typeface="DejaVu Sans"/>
               </a:rPr>
-              <a:t>Before exiting the program, all information will be encrypted and stored on to hard drive.</a:t>
+              <a:t>Before exiting the program, all information will have to option to be saved, and will be stored encrypted on to hard drive.</a:t>
             </a:r>
             <a:endParaRPr b="0" lang="en-US" sz="1800" spc="-1" strike="noStrike">
               <a:solidFill>
@@ -5097,7 +5110,7 @@
         <p:spPr>
           <a:xfrm>
             <a:off x="719640" y="225720"/>
-            <a:ext cx="8854200" cy="946440"/>
+            <a:ext cx="8853480" cy="945720"/>
           </a:xfrm>
           <a:prstGeom prst="rect">
             <a:avLst/>
@@ -5154,7 +5167,7 @@
         <p:spPr>
           <a:xfrm>
             <a:off x="719640" y="1280160"/>
-            <a:ext cx="8638560" cy="3287880"/>
+            <a:ext cx="8637840" cy="3287160"/>
           </a:xfrm>
           <a:prstGeom prst="rect">
             <a:avLst/>
@@ -5173,7 +5186,7 @@
         <p:txBody>
           <a:bodyPr lIns="0" rIns="0" tIns="0" bIns="0"/>
           <a:p>
-            <a:pPr marL="432000" indent="-323280">
+            <a:pPr marL="432000" indent="-322560">
               <a:lnSpc>
                 <a:spcPct val="100000"/>
               </a:lnSpc>
@@ -5200,7 +5213,7 @@
                 <a:latin typeface="Open Sans"/>
                 <a:ea typeface="DejaVu Sans"/>
               </a:rPr>
-              <a:t>User will enter their password and optional keyfile for 2-step authentication </a:t>
+              <a:t>User will enter their password and optional keyfile for 2-factor authentication </a:t>
             </a:r>
             <a:endParaRPr b="0" lang="en-US" sz="1800" spc="-1" strike="noStrike">
               <a:solidFill>
@@ -5215,7 +5228,7 @@
             </a:endParaRPr>
           </a:p>
           <a:p>
-            <a:pPr marL="432000" indent="-323280">
+            <a:pPr marL="432000" indent="-322560">
               <a:lnSpc>
                 <a:spcPct val="100000"/>
               </a:lnSpc>
@@ -5242,7 +5255,7 @@
                 <a:latin typeface="Open Sans"/>
                 <a:ea typeface="DejaVu Sans"/>
               </a:rPr>
-              <a:t>The program will convert both the password and the file into a byte arrays.</a:t>
+              <a:t>The program will convert both the password and the file contents into byte arrays.</a:t>
             </a:r>
             <a:endParaRPr b="0" lang="en-US" sz="1800" spc="-1" strike="noStrike">
               <a:solidFill>
@@ -5257,7 +5270,7 @@
             </a:endParaRPr>
           </a:p>
           <a:p>
-            <a:pPr marL="432000" indent="-323280">
+            <a:pPr marL="432000" indent="-322560">
               <a:lnSpc>
                 <a:spcPct val="100000"/>
               </a:lnSpc>
@@ -5299,7 +5312,7 @@
             </a:endParaRPr>
           </a:p>
           <a:p>
-            <a:pPr marL="432000" indent="-323280">
+            <a:pPr marL="432000" indent="-322560">
               <a:lnSpc>
                 <a:spcPct val="100000"/>
               </a:lnSpc>
@@ -5400,7 +5413,7 @@
         <p:spPr>
           <a:xfrm>
             <a:off x="719640" y="225720"/>
-            <a:ext cx="8854200" cy="946440"/>
+            <a:ext cx="8853480" cy="945720"/>
           </a:xfrm>
           <a:prstGeom prst="rect">
             <a:avLst/>
@@ -5457,7 +5470,7 @@
         <p:spPr>
           <a:xfrm>
             <a:off x="719640" y="1620000"/>
-            <a:ext cx="8638560" cy="3287880"/>
+            <a:ext cx="8637840" cy="3287160"/>
           </a:xfrm>
           <a:prstGeom prst="rect">
             <a:avLst/>
@@ -5483,7 +5496,7 @@
         <p:spPr>
           <a:xfrm>
             <a:off x="640080" y="1280160"/>
-            <a:ext cx="1188720" cy="3749040"/>
+            <a:ext cx="1188000" cy="3748320"/>
           </a:xfrm>
           <a:prstGeom prst="rect">
             <a:avLst/>
@@ -5506,7 +5519,11 @@
         <p:txBody>
           <a:bodyPr wrap="none" lIns="90000" rIns="90000" tIns="45000" bIns="45000" anchor="ctr"/>
           <a:p>
-            <a:pPr algn="ctr"/>
+            <a:pPr algn="ctr">
+              <a:lnSpc>
+                <a:spcPct val="100000"/>
+              </a:lnSpc>
+            </a:pPr>
             <a:r>
               <a:rPr b="0" lang="en-US" sz="1800" spc="-1" strike="noStrike">
                 <a:solidFill>
@@ -5518,6 +5535,7 @@
                   </a:solidFill>
                 </a:uFill>
                 <a:latin typeface="Arial"/>
+                <a:ea typeface="DejaVu Sans"/>
               </a:rPr>
               <a:t>Vault</a:t>
             </a:r>
@@ -5544,7 +5562,7 @@
         <p:spPr>
           <a:xfrm>
             <a:off x="4206240" y="1280160"/>
-            <a:ext cx="2743200" cy="1097280"/>
+            <a:ext cx="2742480" cy="1096560"/>
           </a:xfrm>
           <a:prstGeom prst="rect">
             <a:avLst/>
@@ -5567,7 +5585,11 @@
         <p:txBody>
           <a:bodyPr wrap="none" lIns="90000" rIns="90000" tIns="45000" bIns="45000" anchor="ctr"/>
           <a:p>
-            <a:pPr algn="ctr"/>
+            <a:pPr algn="ctr">
+              <a:lnSpc>
+                <a:spcPct val="100000"/>
+              </a:lnSpc>
+            </a:pPr>
             <a:r>
               <a:rPr b="0" lang="en-US" sz="1800" spc="-1" strike="noStrike">
                 <a:solidFill>
@@ -5579,6 +5601,7 @@
                   </a:solidFill>
                 </a:uFill>
                 <a:latin typeface="Arial"/>
+                <a:ea typeface="DejaVu Sans"/>
               </a:rPr>
               <a:t>VaultEntry</a:t>
             </a:r>
@@ -5605,7 +5628,7 @@
         <p:spPr>
           <a:xfrm>
             <a:off x="6949440" y="1280160"/>
-            <a:ext cx="1371600" cy="1097280"/>
+            <a:ext cx="1370880" cy="1096560"/>
           </a:xfrm>
           <a:prstGeom prst="rect">
             <a:avLst/>
@@ -5628,7 +5651,11 @@
         <p:txBody>
           <a:bodyPr wrap="none" lIns="90000" rIns="90000" tIns="45000" bIns="45000" anchor="ctr"/>
           <a:p>
-            <a:pPr algn="ctr"/>
+            <a:pPr algn="ctr">
+              <a:lnSpc>
+                <a:spcPct val="100000"/>
+              </a:lnSpc>
+            </a:pPr>
             <a:r>
               <a:rPr b="0" lang="en-US" sz="1800" spc="-1" strike="noStrike">
                 <a:solidFill>
@@ -5640,6 +5667,7 @@
                   </a:solidFill>
                 </a:uFill>
                 <a:latin typeface="Arial"/>
+                <a:ea typeface="DejaVu Sans"/>
               </a:rPr>
               <a:t>id</a:t>
             </a:r>
@@ -5656,7 +5684,11 @@
             </a:endParaRPr>
           </a:p>
           <a:p>
-            <a:pPr algn="ctr"/>
+            <a:pPr algn="ctr">
+              <a:lnSpc>
+                <a:spcPct val="100000"/>
+              </a:lnSpc>
+            </a:pPr>
             <a:r>
               <a:rPr b="0" lang="en-US" sz="1800" spc="-1" strike="noStrike">
                 <a:solidFill>
@@ -5668,6 +5700,7 @@
                   </a:solidFill>
                 </a:uFill>
                 <a:latin typeface="Arial"/>
+                <a:ea typeface="DejaVu Sans"/>
               </a:rPr>
               <a:t>Label</a:t>
             </a:r>
@@ -5684,7 +5717,11 @@
             </a:endParaRPr>
           </a:p>
           <a:p>
-            <a:pPr algn="ctr"/>
+            <a:pPr algn="ctr">
+              <a:lnSpc>
+                <a:spcPct val="100000"/>
+              </a:lnSpc>
+            </a:pPr>
             <a:r>
               <a:rPr b="0" lang="en-US" sz="1800" spc="-1" strike="noStrike">
                 <a:solidFill>
@@ -5696,6 +5733,7 @@
                   </a:solidFill>
                 </a:uFill>
                 <a:latin typeface="Arial"/>
+                <a:ea typeface="DejaVu Sans"/>
               </a:rPr>
               <a:t>Username</a:t>
             </a:r>
@@ -5712,7 +5750,11 @@
             </a:endParaRPr>
           </a:p>
           <a:p>
-            <a:pPr algn="ctr"/>
+            <a:pPr algn="ctr">
+              <a:lnSpc>
+                <a:spcPct val="100000"/>
+              </a:lnSpc>
+            </a:pPr>
             <a:r>
               <a:rPr b="0" lang="en-US" sz="1800" spc="-1" strike="noStrike">
                 <a:solidFill>
@@ -5724,6 +5766,7 @@
                   </a:solidFill>
                 </a:uFill>
                 <a:latin typeface="Arial"/>
+                <a:ea typeface="DejaVu Sans"/>
               </a:rPr>
               <a:t>Password</a:t>
             </a:r>
@@ -5750,7 +5793,7 @@
         <p:spPr>
           <a:xfrm>
             <a:off x="4206240" y="2743200"/>
-            <a:ext cx="2743200" cy="1097280"/>
+            <a:ext cx="2742480" cy="1096560"/>
           </a:xfrm>
           <a:prstGeom prst="rect">
             <a:avLst/>
@@ -5773,7 +5816,11 @@
         <p:txBody>
           <a:bodyPr wrap="none" lIns="90000" rIns="90000" tIns="45000" bIns="45000" anchor="ctr"/>
           <a:p>
-            <a:pPr algn="ctr"/>
+            <a:pPr algn="ctr">
+              <a:lnSpc>
+                <a:spcPct val="100000"/>
+              </a:lnSpc>
+            </a:pPr>
             <a:r>
               <a:rPr b="0" lang="en-US" sz="1800" spc="-1" strike="noStrike">
                 <a:solidFill>
@@ -5785,6 +5832,7 @@
                   </a:solidFill>
                 </a:uFill>
                 <a:latin typeface="Arial"/>
+                <a:ea typeface="DejaVu Sans"/>
               </a:rPr>
               <a:t>VaultEntry</a:t>
             </a:r>
@@ -5811,7 +5859,7 @@
         <p:spPr>
           <a:xfrm>
             <a:off x="6949440" y="2743200"/>
-            <a:ext cx="1371600" cy="1097280"/>
+            <a:ext cx="1370880" cy="1096560"/>
           </a:xfrm>
           <a:prstGeom prst="rect">
             <a:avLst/>
@@ -5834,7 +5882,11 @@
         <p:txBody>
           <a:bodyPr wrap="none" lIns="90000" rIns="90000" tIns="45000" bIns="45000" anchor="ctr"/>
           <a:p>
-            <a:pPr algn="ctr"/>
+            <a:pPr algn="ctr">
+              <a:lnSpc>
+                <a:spcPct val="100000"/>
+              </a:lnSpc>
+            </a:pPr>
             <a:r>
               <a:rPr b="0" lang="en-US" sz="1800" spc="-1" strike="noStrike">
                 <a:solidFill>
@@ -5846,6 +5898,7 @@
                   </a:solidFill>
                 </a:uFill>
                 <a:latin typeface="Arial"/>
+                <a:ea typeface="DejaVu Sans"/>
               </a:rPr>
               <a:t>id</a:t>
             </a:r>
@@ -5862,7 +5915,11 @@
             </a:endParaRPr>
           </a:p>
           <a:p>
-            <a:pPr algn="ctr"/>
+            <a:pPr algn="ctr">
+              <a:lnSpc>
+                <a:spcPct val="100000"/>
+              </a:lnSpc>
+            </a:pPr>
             <a:r>
               <a:rPr b="0" lang="en-US" sz="1800" spc="-1" strike="noStrike">
                 <a:solidFill>
@@ -5874,6 +5931,7 @@
                   </a:solidFill>
                 </a:uFill>
                 <a:latin typeface="Arial"/>
+                <a:ea typeface="DejaVu Sans"/>
               </a:rPr>
               <a:t>Label</a:t>
             </a:r>
@@ -5890,7 +5948,11 @@
             </a:endParaRPr>
           </a:p>
           <a:p>
-            <a:pPr algn="ctr"/>
+            <a:pPr algn="ctr">
+              <a:lnSpc>
+                <a:spcPct val="100000"/>
+              </a:lnSpc>
+            </a:pPr>
             <a:r>
               <a:rPr b="0" lang="en-US" sz="1800" spc="-1" strike="noStrike">
                 <a:solidFill>
@@ -5902,6 +5964,7 @@
                   </a:solidFill>
                 </a:uFill>
                 <a:latin typeface="Arial"/>
+                <a:ea typeface="DejaVu Sans"/>
               </a:rPr>
               <a:t>Username</a:t>
             </a:r>
@@ -5918,7 +5981,11 @@
             </a:endParaRPr>
           </a:p>
           <a:p>
-            <a:pPr algn="ctr"/>
+            <a:pPr algn="ctr">
+              <a:lnSpc>
+                <a:spcPct val="100000"/>
+              </a:lnSpc>
+            </a:pPr>
             <a:r>
               <a:rPr b="0" lang="en-US" sz="1800" spc="-1" strike="noStrike">
                 <a:solidFill>
@@ -5930,6 +5997,7 @@
                   </a:solidFill>
                 </a:uFill>
                 <a:latin typeface="Arial"/>
+                <a:ea typeface="DejaVu Sans"/>
               </a:rPr>
               <a:t>Password</a:t>
             </a:r>
@@ -5956,7 +6024,7 @@
         <p:spPr>
           <a:xfrm>
             <a:off x="4206240" y="4297680"/>
-            <a:ext cx="2743200" cy="1097280"/>
+            <a:ext cx="2742480" cy="1096560"/>
           </a:xfrm>
           <a:prstGeom prst="rect">
             <a:avLst/>
@@ -5979,7 +6047,11 @@
         <p:txBody>
           <a:bodyPr wrap="none" lIns="90000" rIns="90000" tIns="45000" bIns="45000" anchor="ctr"/>
           <a:p>
-            <a:pPr algn="ctr"/>
+            <a:pPr algn="ctr">
+              <a:lnSpc>
+                <a:spcPct val="100000"/>
+              </a:lnSpc>
+            </a:pPr>
             <a:r>
               <a:rPr b="0" lang="en-US" sz="1800" spc="-1" strike="noStrike">
                 <a:solidFill>
@@ -5991,6 +6063,7 @@
                   </a:solidFill>
                 </a:uFill>
                 <a:latin typeface="Arial"/>
+                <a:ea typeface="DejaVu Sans"/>
               </a:rPr>
               <a:t>VaultEntry</a:t>
             </a:r>
@@ -6017,7 +6090,7 @@
         <p:spPr>
           <a:xfrm>
             <a:off x="6949440" y="4297680"/>
-            <a:ext cx="1371600" cy="1097280"/>
+            <a:ext cx="1370880" cy="1096560"/>
           </a:xfrm>
           <a:prstGeom prst="rect">
             <a:avLst/>
@@ -6040,7 +6113,11 @@
         <p:txBody>
           <a:bodyPr wrap="none" lIns="90000" rIns="90000" tIns="45000" bIns="45000" anchor="ctr"/>
           <a:p>
-            <a:pPr algn="ctr"/>
+            <a:pPr algn="ctr">
+              <a:lnSpc>
+                <a:spcPct val="100000"/>
+              </a:lnSpc>
+            </a:pPr>
             <a:r>
               <a:rPr b="0" lang="en-US" sz="1800" spc="-1" strike="noStrike">
                 <a:solidFill>
@@ -6052,6 +6129,7 @@
                   </a:solidFill>
                 </a:uFill>
                 <a:latin typeface="Arial"/>
+                <a:ea typeface="DejaVu Sans"/>
               </a:rPr>
               <a:t>id</a:t>
             </a:r>
@@ -6068,7 +6146,11 @@
             </a:endParaRPr>
           </a:p>
           <a:p>
-            <a:pPr algn="ctr"/>
+            <a:pPr algn="ctr">
+              <a:lnSpc>
+                <a:spcPct val="100000"/>
+              </a:lnSpc>
+            </a:pPr>
             <a:r>
               <a:rPr b="0" lang="en-US" sz="1800" spc="-1" strike="noStrike">
                 <a:solidFill>
@@ -6080,6 +6162,7 @@
                   </a:solidFill>
                 </a:uFill>
                 <a:latin typeface="Arial"/>
+                <a:ea typeface="DejaVu Sans"/>
               </a:rPr>
               <a:t>Label</a:t>
             </a:r>
@@ -6096,7 +6179,11 @@
             </a:endParaRPr>
           </a:p>
           <a:p>
-            <a:pPr algn="ctr"/>
+            <a:pPr algn="ctr">
+              <a:lnSpc>
+                <a:spcPct val="100000"/>
+              </a:lnSpc>
+            </a:pPr>
             <a:r>
               <a:rPr b="0" lang="en-US" sz="1800" spc="-1" strike="noStrike">
                 <a:solidFill>
@@ -6108,6 +6195,7 @@
                   </a:solidFill>
                 </a:uFill>
                 <a:latin typeface="Arial"/>
+                <a:ea typeface="DejaVu Sans"/>
               </a:rPr>
               <a:t>Username</a:t>
             </a:r>
@@ -6124,7 +6212,11 @@
             </a:endParaRPr>
           </a:p>
           <a:p>
-            <a:pPr algn="ctr"/>
+            <a:pPr algn="ctr">
+              <a:lnSpc>
+                <a:spcPct val="100000"/>
+              </a:lnSpc>
+            </a:pPr>
             <a:r>
               <a:rPr b="0" lang="en-US" sz="1800" spc="-1" strike="noStrike">
                 <a:solidFill>
@@ -6136,6 +6228,7 @@
                   </a:solidFill>
                 </a:uFill>
                 <a:latin typeface="Arial"/>
+                <a:ea typeface="DejaVu Sans"/>
               </a:rPr>
               <a:t>Password</a:t>
             </a:r>
@@ -6153,23 +6246,34 @@
           </a:p>
         </p:txBody>
       </p:sp>
-      <p:cxnSp>
-        <p:nvCxnSpPr>
-          <p:cNvPr id="99" name="Line 10"/>
-          <p:cNvCxnSpPr>
-            <a:stCxn id="92" idx="3"/>
-            <a:endCxn id="93" idx="1"/>
-          </p:cNvCxnSpPr>
+      <p:sp>
+        <p:nvSpPr>
+          <p:cNvPr id="99" name="CustomShape 10"/>
+          <p:cNvSpPr/>
           <p:nvPr/>
-        </p:nvCxnSpPr>
+        </p:nvSpPr>
         <p:spPr>
           <a:xfrm flipV="1">
-            <a:off x="1828800" y="1828800"/>
-            <a:ext cx="2377800" cy="1326240"/>
-          </a:xfrm>
-          <a:prstGeom prst="straightConnector1">
-            <a:avLst/>
-          </a:prstGeom>
+            <a:off x="1828800" y="1828080"/>
+            <a:ext cx="2377080" cy="1325520"/>
+          </a:xfrm>
+          <a:custGeom>
+            <a:avLst/>
+            <a:gdLst/>
+            <a:ahLst/>
+            <a:rect l="l" t="t" r="r" b="b"/>
+            <a:pathLst>
+              <a:path w="21600" h="21600">
+                <a:moveTo>
+                  <a:pt x="0" y="0"/>
+                </a:moveTo>
+                <a:lnTo>
+                  <a:pt x="21600" y="21600"/>
+                </a:lnTo>
+              </a:path>
+            </a:pathLst>
+          </a:custGeom>
+          <a:noFill/>
           <a:ln>
             <a:solidFill>
               <a:srgbClr val="000000"/>
@@ -6177,24 +6281,41 @@
             <a:tailEnd len="med" type="triangle" w="med"/>
           </a:ln>
         </p:spPr>
-      </p:cxnSp>
-      <p:cxnSp>
-        <p:nvCxnSpPr>
-          <p:cNvPr id="100" name="Line 11"/>
-          <p:cNvCxnSpPr>
-            <a:stCxn id="93" idx="2"/>
-            <a:endCxn id="95" idx="0"/>
-          </p:cNvCxnSpPr>
+        <p:style>
+          <a:lnRef idx="0"/>
+          <a:fillRef idx="0"/>
+          <a:effectRef idx="0"/>
+          <a:fontRef idx="minor"/>
+        </p:style>
+      </p:sp>
+      <p:sp>
+        <p:nvSpPr>
+          <p:cNvPr id="100" name="CustomShape 11"/>
+          <p:cNvSpPr/>
           <p:nvPr/>
-        </p:nvCxnSpPr>
+        </p:nvSpPr>
         <p:spPr>
           <a:xfrm>
             <a:off x="5577840" y="2377440"/>
-            <a:ext cx="360" cy="366120"/>
-          </a:xfrm>
-          <a:prstGeom prst="straightConnector1">
-            <a:avLst/>
-          </a:prstGeom>
+            <a:ext cx="360" cy="365400"/>
+          </a:xfrm>
+          <a:custGeom>
+            <a:avLst/>
+            <a:gdLst/>
+            <a:ahLst/>
+            <a:rect l="l" t="t" r="r" b="b"/>
+            <a:pathLst>
+              <a:path w="21600" h="21600">
+                <a:moveTo>
+                  <a:pt x="0" y="0"/>
+                </a:moveTo>
+                <a:lnTo>
+                  <a:pt x="21600" y="21600"/>
+                </a:lnTo>
+              </a:path>
+            </a:pathLst>
+          </a:custGeom>
+          <a:noFill/>
           <a:ln>
             <a:solidFill>
               <a:srgbClr val="000000"/>
@@ -6203,24 +6324,41 @@
             <a:tailEnd len="med" type="triangle" w="med"/>
           </a:ln>
         </p:spPr>
-      </p:cxnSp>
-      <p:cxnSp>
-        <p:nvCxnSpPr>
-          <p:cNvPr id="101" name="Line 12"/>
-          <p:cNvCxnSpPr>
-            <a:stCxn id="95" idx="2"/>
-            <a:endCxn id="97" idx="0"/>
-          </p:cNvCxnSpPr>
+        <p:style>
+          <a:lnRef idx="0"/>
+          <a:fillRef idx="0"/>
+          <a:effectRef idx="0"/>
+          <a:fontRef idx="minor"/>
+        </p:style>
+      </p:sp>
+      <p:sp>
+        <p:nvSpPr>
+          <p:cNvPr id="101" name="CustomShape 12"/>
+          <p:cNvSpPr/>
           <p:nvPr/>
-        </p:nvCxnSpPr>
+        </p:nvSpPr>
         <p:spPr>
           <a:xfrm>
             <a:off x="5577840" y="3840480"/>
-            <a:ext cx="360" cy="457560"/>
-          </a:xfrm>
-          <a:prstGeom prst="straightConnector1">
-            <a:avLst/>
-          </a:prstGeom>
+            <a:ext cx="360" cy="456840"/>
+          </a:xfrm>
+          <a:custGeom>
+            <a:avLst/>
+            <a:gdLst/>
+            <a:ahLst/>
+            <a:rect l="l" t="t" r="r" b="b"/>
+            <a:pathLst>
+              <a:path w="21600" h="21600">
+                <a:moveTo>
+                  <a:pt x="0" y="0"/>
+                </a:moveTo>
+                <a:lnTo>
+                  <a:pt x="21600" y="21600"/>
+                </a:lnTo>
+              </a:path>
+            </a:pathLst>
+          </a:custGeom>
+          <a:noFill/>
           <a:ln>
             <a:solidFill>
               <a:srgbClr val="000000"/>
@@ -6229,13 +6367,19 @@
             <a:tailEnd len="med" type="triangle" w="med"/>
           </a:ln>
         </p:spPr>
-      </p:cxnSp>
-      <p:cxnSp>
-        <p:nvCxnSpPr>
+        <p:style>
+          <a:lnRef idx="0"/>
+          <a:fillRef idx="0"/>
+          <a:effectRef idx="0"/>
+          <a:fontRef idx="minor"/>
+        </p:style>
+      </p:sp>
+      <p:sp>
+        <p:nvSpPr>
           <p:cNvPr id="102" name="Line 13"/>
-          <p:cNvCxnSpPr/>
+          <p:cNvSpPr/>
           <p:nvPr/>
-        </p:nvCxnSpPr>
+        </p:nvSpPr>
         <p:spPr>
           <a:xfrm>
             <a:off x="0" y="0"/>
@@ -6251,7 +6395,13 @@
             <a:tailEnd len="med" type="triangle" w="med"/>
           </a:ln>
         </p:spPr>
-      </p:cxnSp>
+        <p:style>
+          <a:lnRef idx="0"/>
+          <a:fillRef idx="0"/>
+          <a:effectRef idx="0"/>
+          <a:fontRef idx="minor"/>
+        </p:style>
+      </p:sp>
     </p:spTree>
   </p:cSld>
   <p:timing>
@@ -6310,7 +6460,7 @@
         <p:spPr>
           <a:xfrm>
             <a:off x="719640" y="225720"/>
-            <a:ext cx="8854200" cy="946440"/>
+            <a:ext cx="8853480" cy="945720"/>
           </a:xfrm>
           <a:prstGeom prst="rect">
             <a:avLst/>
@@ -6367,7 +6517,7 @@
         <p:spPr>
           <a:xfrm>
             <a:off x="914400" y="1554480"/>
-            <a:ext cx="8443800" cy="4297680"/>
+            <a:ext cx="8443080" cy="4296960"/>
           </a:xfrm>
           <a:prstGeom prst="rect">
             <a:avLst/>
@@ -6397,7 +6547,7 @@
         <p:spPr>
           <a:xfrm>
             <a:off x="719640" y="1620000"/>
-            <a:ext cx="8638560" cy="3287880"/>
+            <a:ext cx="8637840" cy="3287160"/>
           </a:xfrm>
           <a:prstGeom prst="rect">
             <a:avLst/>
@@ -6423,7 +6573,7 @@
         <p:spPr>
           <a:xfrm>
             <a:off x="1280160" y="1920240"/>
-            <a:ext cx="2194560" cy="365760"/>
+            <a:ext cx="2193840" cy="365040"/>
           </a:xfrm>
           <a:prstGeom prst="rect">
             <a:avLst/>
@@ -6446,7 +6596,11 @@
         <p:txBody>
           <a:bodyPr wrap="none" lIns="90000" rIns="90000" tIns="45000" bIns="45000" anchor="ctr"/>
           <a:p>
-            <a:pPr algn="ctr"/>
+            <a:pPr algn="ctr">
+              <a:lnSpc>
+                <a:spcPct val="100000"/>
+              </a:lnSpc>
+            </a:pPr>
             <a:r>
               <a:rPr b="0" lang="en-US" sz="1800" spc="-1" strike="noStrike">
                 <a:solidFill>
@@ -6458,6 +6612,7 @@
                   </a:solidFill>
                 </a:uFill>
                 <a:latin typeface="Arial"/>
+                <a:ea typeface="DejaVu Sans"/>
               </a:rPr>
               <a:t>firstId</a:t>
             </a:r>
@@ -6484,7 +6639,7 @@
         <p:spPr>
           <a:xfrm>
             <a:off x="4206240" y="1828800"/>
-            <a:ext cx="3108960" cy="914400"/>
+            <a:ext cx="3108240" cy="913680"/>
           </a:xfrm>
           <a:prstGeom prst="rect">
             <a:avLst/>
@@ -6503,7 +6658,7 @@
         <p:txBody>
           <a:bodyPr lIns="0" rIns="0" tIns="0" bIns="0"/>
           <a:p>
-            <a:pPr marL="432000" indent="-323280" algn="ctr">
+            <a:pPr marL="432000" indent="-322560" algn="ctr">
               <a:lnSpc>
                 <a:spcPct val="100000"/>
               </a:lnSpc>
@@ -6555,7 +6710,7 @@
         <p:spPr>
           <a:xfrm>
             <a:off x="719640" y="1005840"/>
-            <a:ext cx="8638560" cy="3735720"/>
+            <a:ext cx="8637840" cy="3735000"/>
           </a:xfrm>
           <a:prstGeom prst="rect">
             <a:avLst/>
@@ -6574,7 +6729,7 @@
         <p:txBody>
           <a:bodyPr lIns="0" rIns="0" tIns="0" bIns="0"/>
           <a:p>
-            <a:pPr marL="432000" indent="-323280" algn="ctr">
+            <a:pPr marL="432000" indent="-322560" algn="ctr">
               <a:lnSpc>
                 <a:spcPct val="100000"/>
               </a:lnSpc>
@@ -6626,7 +6781,7 @@
         <p:spPr>
           <a:xfrm>
             <a:off x="4206240" y="3657600"/>
-            <a:ext cx="3108960" cy="914400"/>
+            <a:ext cx="3108240" cy="913680"/>
           </a:xfrm>
           <a:prstGeom prst="rect">
             <a:avLst/>
@@ -6645,7 +6800,7 @@
         <p:txBody>
           <a:bodyPr lIns="0" rIns="0" tIns="0" bIns="0"/>
           <a:p>
-            <a:pPr marL="432000" indent="-323280" algn="ctr">
+            <a:pPr marL="432000" indent="-322560" algn="ctr">
               <a:lnSpc>
                 <a:spcPct val="100000"/>
               </a:lnSpc>
@@ -6697,7 +6852,7 @@
         <p:spPr>
           <a:xfrm>
             <a:off x="3108960" y="1920240"/>
-            <a:ext cx="365760" cy="365760"/>
+            <a:ext cx="365040" cy="365040"/>
           </a:xfrm>
           <a:prstGeom prst="rect">
             <a:avLst/>
@@ -6720,7 +6875,11 @@
         <p:txBody>
           <a:bodyPr wrap="none" lIns="90000" rIns="90000" tIns="45000" bIns="45000" anchor="ctr"/>
           <a:p>
-            <a:pPr algn="ctr"/>
+            <a:pPr algn="ctr">
+              <a:lnSpc>
+                <a:spcPct val="100000"/>
+              </a:lnSpc>
+            </a:pPr>
             <a:r>
               <a:rPr b="0" lang="en-US" sz="1800" spc="-1" strike="noStrike">
                 <a:solidFill>
@@ -6732,6 +6891,7 @@
                   </a:solidFill>
                 </a:uFill>
                 <a:latin typeface="Arial"/>
+                <a:ea typeface="DejaVu Sans"/>
               </a:rPr>
               <a:t>0</a:t>
             </a:r>
@@ -6758,7 +6918,7 @@
         <p:spPr>
           <a:xfrm>
             <a:off x="1280160" y="2286000"/>
-            <a:ext cx="2194560" cy="365760"/>
+            <a:ext cx="2193840" cy="365040"/>
           </a:xfrm>
           <a:prstGeom prst="rect">
             <a:avLst/>
@@ -6781,7 +6941,11 @@
         <p:txBody>
           <a:bodyPr wrap="none" lIns="90000" rIns="90000" tIns="45000" bIns="45000" anchor="ctr"/>
           <a:p>
-            <a:pPr algn="ctr"/>
+            <a:pPr algn="ctr">
+              <a:lnSpc>
+                <a:spcPct val="100000"/>
+              </a:lnSpc>
+            </a:pPr>
             <a:r>
               <a:rPr b="0" lang="en-US" sz="1800" spc="-1" strike="noStrike">
                 <a:solidFill>
@@ -6793,6 +6957,7 @@
                   </a:solidFill>
                 </a:uFill>
                 <a:latin typeface="Arial"/>
+                <a:ea typeface="DejaVu Sans"/>
               </a:rPr>
               <a:t>lastId</a:t>
             </a:r>
@@ -6819,7 +6984,7 @@
         <p:spPr>
           <a:xfrm>
             <a:off x="3108960" y="2286000"/>
-            <a:ext cx="365760" cy="365760"/>
+            <a:ext cx="365040" cy="365040"/>
           </a:xfrm>
           <a:prstGeom prst="rect">
             <a:avLst/>
@@ -6842,7 +7007,11 @@
         <p:txBody>
           <a:bodyPr wrap="none" lIns="90000" rIns="90000" tIns="45000" bIns="45000" anchor="ctr"/>
           <a:p>
-            <a:pPr algn="ctr"/>
+            <a:pPr algn="ctr">
+              <a:lnSpc>
+                <a:spcPct val="100000"/>
+              </a:lnSpc>
+            </a:pPr>
             <a:r>
               <a:rPr b="0" lang="en-US" sz="1800" spc="-1" strike="noStrike">
                 <a:solidFill>
@@ -6854,6 +7023,7 @@
                   </a:solidFill>
                 </a:uFill>
                 <a:latin typeface="Arial"/>
+                <a:ea typeface="DejaVu Sans"/>
               </a:rPr>
               <a:t>2</a:t>
             </a:r>
@@ -6880,7 +7050,7 @@
         <p:spPr>
           <a:xfrm>
             <a:off x="1280160" y="3200400"/>
-            <a:ext cx="2194560" cy="365760"/>
+            <a:ext cx="2193840" cy="365040"/>
           </a:xfrm>
           <a:prstGeom prst="rect">
             <a:avLst/>
@@ -6903,7 +7073,11 @@
         <p:txBody>
           <a:bodyPr wrap="none" lIns="90000" rIns="90000" tIns="45000" bIns="45000" anchor="ctr"/>
           <a:p>
-            <a:pPr algn="ctr"/>
+            <a:pPr algn="ctr">
+              <a:lnSpc>
+                <a:spcPct val="100000"/>
+              </a:lnSpc>
+            </a:pPr>
             <a:r>
               <a:rPr b="0" lang="en-US" sz="1800" spc="-1" strike="noStrike">
                 <a:solidFill>
@@ -6915,6 +7089,7 @@
                   </a:solidFill>
                 </a:uFill>
                 <a:latin typeface="Arial"/>
+                <a:ea typeface="DejaVu Sans"/>
               </a:rPr>
               <a:t>nextFreeId</a:t>
             </a:r>
@@ -6941,7 +7116,7 @@
         <p:spPr>
           <a:xfrm>
             <a:off x="3108960" y="3200400"/>
-            <a:ext cx="365760" cy="365760"/>
+            <a:ext cx="365040" cy="365040"/>
           </a:xfrm>
           <a:prstGeom prst="rect">
             <a:avLst/>
@@ -6964,7 +7139,11 @@
         <p:txBody>
           <a:bodyPr wrap="none" lIns="90000" rIns="90000" tIns="45000" bIns="45000" anchor="ctr"/>
           <a:p>
-            <a:pPr algn="ctr"/>
+            <a:pPr algn="ctr">
+              <a:lnSpc>
+                <a:spcPct val="100000"/>
+              </a:lnSpc>
+            </a:pPr>
             <a:r>
               <a:rPr b="0" lang="en-US" sz="1800" spc="-1" strike="noStrike">
                 <a:solidFill>
@@ -6976,6 +7155,7 @@
                   </a:solidFill>
                 </a:uFill>
                 <a:latin typeface="Arial"/>
+                <a:ea typeface="DejaVu Sans"/>
               </a:rPr>
               <a:t>3</a:t>
             </a:r>
@@ -7002,7 +7182,7 @@
         <p:spPr>
           <a:xfrm>
             <a:off x="6583680" y="1645920"/>
-            <a:ext cx="1280160" cy="365760"/>
+            <a:ext cx="1279440" cy="365040"/>
           </a:xfrm>
           <a:prstGeom prst="rect">
             <a:avLst/>
@@ -7025,7 +7205,11 @@
         <p:txBody>
           <a:bodyPr wrap="none" lIns="90000" rIns="90000" tIns="45000" bIns="45000" anchor="ctr"/>
           <a:p>
-            <a:pPr algn="ctr"/>
+            <a:pPr algn="ctr">
+              <a:lnSpc>
+                <a:spcPct val="100000"/>
+              </a:lnSpc>
+            </a:pPr>
             <a:r>
               <a:rPr b="0" lang="en-US" sz="1800" spc="-1" strike="noStrike">
                 <a:solidFill>
@@ -7037,6 +7221,7 @@
                   </a:solidFill>
                 </a:uFill>
                 <a:latin typeface="Arial"/>
+                <a:ea typeface="DejaVu Sans"/>
               </a:rPr>
               <a:t>label0</a:t>
             </a:r>
@@ -7063,7 +7248,7 @@
         <p:spPr>
           <a:xfrm>
             <a:off x="7863840" y="1645920"/>
-            <a:ext cx="1280160" cy="365760"/>
+            <a:ext cx="1279440" cy="365040"/>
           </a:xfrm>
           <a:prstGeom prst="rect">
             <a:avLst/>
@@ -7086,7 +7271,11 @@
         <p:txBody>
           <a:bodyPr wrap="none" lIns="90000" rIns="90000" tIns="45000" bIns="45000" anchor="ctr"/>
           <a:p>
-            <a:pPr algn="ctr"/>
+            <a:pPr algn="ctr">
+              <a:lnSpc>
+                <a:spcPct val="100000"/>
+              </a:lnSpc>
+            </a:pPr>
             <a:r>
               <a:rPr b="0" lang="en-US" sz="1800" spc="-1" strike="noStrike">
                 <a:solidFill>
@@ -7098,6 +7287,7 @@
                   </a:solidFill>
                 </a:uFill>
                 <a:latin typeface="Arial"/>
+                <a:ea typeface="DejaVu Sans"/>
               </a:rPr>
               <a:t>google</a:t>
             </a:r>
@@ -7124,7 +7314,7 @@
         <p:spPr>
           <a:xfrm>
             <a:off x="6583680" y="2011680"/>
-            <a:ext cx="1280160" cy="365760"/>
+            <a:ext cx="1279440" cy="365040"/>
           </a:xfrm>
           <a:prstGeom prst="rect">
             <a:avLst/>
@@ -7147,7 +7337,11 @@
         <p:txBody>
           <a:bodyPr wrap="none" lIns="90000" rIns="90000" tIns="45000" bIns="45000" anchor="ctr"/>
           <a:p>
-            <a:pPr algn="ctr"/>
+            <a:pPr algn="ctr">
+              <a:lnSpc>
+                <a:spcPct val="100000"/>
+              </a:lnSpc>
+            </a:pPr>
             <a:r>
               <a:rPr b="0" lang="en-US" sz="1800" spc="-1" strike="noStrike">
                 <a:solidFill>
@@ -7159,6 +7353,7 @@
                   </a:solidFill>
                 </a:uFill>
                 <a:latin typeface="Arial"/>
+                <a:ea typeface="DejaVu Sans"/>
               </a:rPr>
               <a:t>user0</a:t>
             </a:r>
@@ -7185,7 +7380,7 @@
         <p:spPr>
           <a:xfrm>
             <a:off x="7863840" y="2011680"/>
-            <a:ext cx="1280160" cy="365760"/>
+            <a:ext cx="1279440" cy="365040"/>
           </a:xfrm>
           <a:prstGeom prst="rect">
             <a:avLst/>
@@ -7208,7 +7403,11 @@
         <p:txBody>
           <a:bodyPr wrap="none" lIns="90000" rIns="90000" tIns="45000" bIns="45000" anchor="ctr"/>
           <a:p>
-            <a:pPr algn="ctr"/>
+            <a:pPr algn="ctr">
+              <a:lnSpc>
+                <a:spcPct val="100000"/>
+              </a:lnSpc>
+            </a:pPr>
             <a:r>
               <a:rPr b="0" lang="en-US" sz="1800" spc="-1" strike="noStrike">
                 <a:solidFill>
@@ -7220,6 +7419,7 @@
                   </a:solidFill>
                 </a:uFill>
                 <a:latin typeface="Arial"/>
+                <a:ea typeface="DejaVu Sans"/>
               </a:rPr>
               <a:t>bobble</a:t>
             </a:r>
@@ -7246,7 +7446,7 @@
         <p:spPr>
           <a:xfrm>
             <a:off x="6583680" y="1645920"/>
-            <a:ext cx="1280160" cy="365760"/>
+            <a:ext cx="1279440" cy="365040"/>
           </a:xfrm>
           <a:prstGeom prst="rect">
             <a:avLst/>
@@ -7269,7 +7469,11 @@
         <p:txBody>
           <a:bodyPr wrap="none" lIns="90000" rIns="90000" tIns="45000" bIns="45000" anchor="ctr"/>
           <a:p>
-            <a:pPr algn="ctr"/>
+            <a:pPr algn="ctr">
+              <a:lnSpc>
+                <a:spcPct val="100000"/>
+              </a:lnSpc>
+            </a:pPr>
             <a:r>
               <a:rPr b="0" lang="en-US" sz="1800" spc="-1" strike="noStrike">
                 <a:solidFill>
@@ -7281,6 +7485,7 @@
                   </a:solidFill>
                 </a:uFill>
                 <a:latin typeface="Arial"/>
+                <a:ea typeface="DejaVu Sans"/>
               </a:rPr>
               <a:t>label0</a:t>
             </a:r>
@@ -7307,7 +7512,7 @@
         <p:spPr>
           <a:xfrm>
             <a:off x="7863840" y="1645920"/>
-            <a:ext cx="1280160" cy="365760"/>
+            <a:ext cx="1279440" cy="365040"/>
           </a:xfrm>
           <a:prstGeom prst="rect">
             <a:avLst/>
@@ -7330,7 +7535,11 @@
         <p:txBody>
           <a:bodyPr wrap="none" lIns="90000" rIns="90000" tIns="45000" bIns="45000" anchor="ctr"/>
           <a:p>
-            <a:pPr algn="ctr"/>
+            <a:pPr algn="ctr">
+              <a:lnSpc>
+                <a:spcPct val="100000"/>
+              </a:lnSpc>
+            </a:pPr>
             <a:r>
               <a:rPr b="0" lang="en-US" sz="1800" spc="-1" strike="noStrike">
                 <a:solidFill>
@@ -7342,6 +7551,7 @@
                   </a:solidFill>
                 </a:uFill>
                 <a:latin typeface="Arial"/>
+                <a:ea typeface="DejaVu Sans"/>
               </a:rPr>
               <a:t>google</a:t>
             </a:r>
@@ -7368,7 +7578,7 @@
         <p:spPr>
           <a:xfrm>
             <a:off x="6583680" y="2377440"/>
-            <a:ext cx="1280160" cy="365760"/>
+            <a:ext cx="1279440" cy="365040"/>
           </a:xfrm>
           <a:prstGeom prst="rect">
             <a:avLst/>
@@ -7391,7 +7601,11 @@
         <p:txBody>
           <a:bodyPr wrap="none" lIns="90000" rIns="90000" tIns="45000" bIns="45000" anchor="ctr"/>
           <a:p>
-            <a:pPr algn="ctr"/>
+            <a:pPr algn="ctr">
+              <a:lnSpc>
+                <a:spcPct val="100000"/>
+              </a:lnSpc>
+            </a:pPr>
             <a:r>
               <a:rPr b="0" lang="en-US" sz="1800" spc="-1" strike="noStrike">
                 <a:solidFill>
@@ -7403,6 +7617,7 @@
                   </a:solidFill>
                 </a:uFill>
                 <a:latin typeface="Arial"/>
+                <a:ea typeface="DejaVu Sans"/>
               </a:rPr>
               <a:t>pass0</a:t>
             </a:r>
@@ -7429,7 +7644,7 @@
         <p:spPr>
           <a:xfrm>
             <a:off x="7863840" y="2377440"/>
-            <a:ext cx="1280160" cy="365760"/>
+            <a:ext cx="1279440" cy="365040"/>
           </a:xfrm>
           <a:prstGeom prst="rect">
             <a:avLst/>
@@ -7452,7 +7667,11 @@
         <p:txBody>
           <a:bodyPr wrap="none" lIns="90000" rIns="90000" tIns="45000" bIns="45000" anchor="ctr"/>
           <a:p>
-            <a:pPr algn="ctr"/>
+            <a:pPr algn="ctr">
+              <a:lnSpc>
+                <a:spcPct val="100000"/>
+              </a:lnSpc>
+            </a:pPr>
             <a:r>
               <a:rPr b="0" lang="en-US" sz="1800" spc="-1" strike="noStrike">
                 <a:solidFill>
@@ -7464,6 +7683,7 @@
                   </a:solidFill>
                 </a:uFill>
                 <a:latin typeface="Arial"/>
+                <a:ea typeface="DejaVu Sans"/>
               </a:rPr>
               <a:t>secret@2</a:t>
             </a:r>
@@ -7490,7 +7710,7 @@
         <p:spPr>
           <a:xfrm>
             <a:off x="6583680" y="2743200"/>
-            <a:ext cx="1280160" cy="365760"/>
+            <a:ext cx="1279440" cy="365040"/>
           </a:xfrm>
           <a:prstGeom prst="rect">
             <a:avLst/>
@@ -7513,7 +7733,11 @@
         <p:txBody>
           <a:bodyPr wrap="none" lIns="90000" rIns="90000" tIns="45000" bIns="45000" anchor="ctr"/>
           <a:p>
-            <a:pPr algn="ctr"/>
+            <a:pPr algn="ctr">
+              <a:lnSpc>
+                <a:spcPct val="100000"/>
+              </a:lnSpc>
+            </a:pPr>
             <a:r>
               <a:rPr b="0" lang="en-US" sz="1800" spc="-1" strike="noStrike">
                 <a:solidFill>
@@ -7525,6 +7749,7 @@
                   </a:solidFill>
                 </a:uFill>
                 <a:latin typeface="Arial"/>
+                <a:ea typeface="DejaVu Sans"/>
               </a:rPr>
               <a:t>nextEnt0</a:t>
             </a:r>
@@ -7551,7 +7776,7 @@
         <p:spPr>
           <a:xfrm>
             <a:off x="7863840" y="2743200"/>
-            <a:ext cx="1280160" cy="365760"/>
+            <a:ext cx="1279440" cy="365040"/>
           </a:xfrm>
           <a:prstGeom prst="rect">
             <a:avLst/>
@@ -7574,7 +7799,11 @@
         <p:txBody>
           <a:bodyPr wrap="none" lIns="90000" rIns="90000" tIns="45000" bIns="45000" anchor="ctr"/>
           <a:p>
-            <a:pPr algn="ctr"/>
+            <a:pPr algn="ctr">
+              <a:lnSpc>
+                <a:spcPct val="100000"/>
+              </a:lnSpc>
+            </a:pPr>
             <a:r>
               <a:rPr b="0" lang="en-US" sz="1800" spc="-1" strike="noStrike">
                 <a:solidFill>
@@ -7586,6 +7815,7 @@
                   </a:solidFill>
                 </a:uFill>
                 <a:latin typeface="Arial"/>
+                <a:ea typeface="DejaVu Sans"/>
               </a:rPr>
               <a:t>1</a:t>
             </a:r>
@@ -7612,7 +7842,7 @@
         <p:spPr>
           <a:xfrm>
             <a:off x="6583680" y="3108960"/>
-            <a:ext cx="1280160" cy="365760"/>
+            <a:ext cx="1279440" cy="365040"/>
           </a:xfrm>
           <a:prstGeom prst="rect">
             <a:avLst/>
@@ -7635,7 +7865,11 @@
         <p:txBody>
           <a:bodyPr wrap="none" lIns="90000" rIns="90000" tIns="45000" bIns="45000" anchor="ctr"/>
           <a:p>
-            <a:pPr algn="ctr"/>
+            <a:pPr algn="ctr">
+              <a:lnSpc>
+                <a:spcPct val="100000"/>
+              </a:lnSpc>
+            </a:pPr>
             <a:r>
               <a:rPr b="0" lang="en-US" sz="1800" spc="-1" strike="noStrike">
                 <a:solidFill>
@@ -7647,6 +7881,7 @@
                   </a:solidFill>
                 </a:uFill>
                 <a:latin typeface="Arial"/>
+                <a:ea typeface="DejaVu Sans"/>
               </a:rPr>
               <a:t>prevEnt0</a:t>
             </a:r>
@@ -7673,7 +7908,7 @@
         <p:spPr>
           <a:xfrm>
             <a:off x="7863840" y="3108960"/>
-            <a:ext cx="1280160" cy="365760"/>
+            <a:ext cx="1279440" cy="365040"/>
           </a:xfrm>
           <a:prstGeom prst="rect">
             <a:avLst/>
@@ -7696,7 +7931,11 @@
         <p:txBody>
           <a:bodyPr wrap="none" lIns="90000" rIns="90000" tIns="45000" bIns="45000" anchor="ctr"/>
           <a:p>
-            <a:pPr algn="ctr"/>
+            <a:pPr algn="ctr">
+              <a:lnSpc>
+                <a:spcPct val="100000"/>
+              </a:lnSpc>
+            </a:pPr>
             <a:r>
               <a:rPr b="0" lang="en-US" sz="1800" spc="-1" strike="noStrike">
                 <a:solidFill>
@@ -7708,6 +7947,7 @@
                   </a:solidFill>
                 </a:uFill>
                 <a:latin typeface="Arial"/>
+                <a:ea typeface="DejaVu Sans"/>
               </a:rPr>
               <a:t>-1</a:t>
             </a:r>
@@ -7734,7 +7974,7 @@
         <p:spPr>
           <a:xfrm>
             <a:off x="6583680" y="3566160"/>
-            <a:ext cx="1280160" cy="365760"/>
+            <a:ext cx="1279440" cy="365040"/>
           </a:xfrm>
           <a:prstGeom prst="rect">
             <a:avLst/>
@@ -7757,7 +7997,11 @@
         <p:txBody>
           <a:bodyPr wrap="none" lIns="90000" rIns="90000" tIns="45000" bIns="45000" anchor="ctr"/>
           <a:p>
-            <a:pPr algn="ctr"/>
+            <a:pPr algn="ctr">
+              <a:lnSpc>
+                <a:spcPct val="100000"/>
+              </a:lnSpc>
+            </a:pPr>
             <a:r>
               <a:rPr b="0" lang="en-US" sz="1800" spc="-1" strike="noStrike">
                 <a:solidFill>
@@ -7769,6 +8013,7 @@
                   </a:solidFill>
                 </a:uFill>
                 <a:latin typeface="Arial"/>
+                <a:ea typeface="DejaVu Sans"/>
               </a:rPr>
               <a:t>label0</a:t>
             </a:r>
@@ -7795,7 +8040,7 @@
         <p:spPr>
           <a:xfrm>
             <a:off x="7863840" y="3566160"/>
-            <a:ext cx="1280160" cy="365760"/>
+            <a:ext cx="1279440" cy="365040"/>
           </a:xfrm>
           <a:prstGeom prst="rect">
             <a:avLst/>
@@ -7818,7 +8063,11 @@
         <p:txBody>
           <a:bodyPr wrap="none" lIns="90000" rIns="90000" tIns="45000" bIns="45000" anchor="ctr"/>
           <a:p>
-            <a:pPr algn="ctr"/>
+            <a:pPr algn="ctr">
+              <a:lnSpc>
+                <a:spcPct val="100000"/>
+              </a:lnSpc>
+            </a:pPr>
             <a:r>
               <a:rPr b="0" lang="en-US" sz="1800" spc="-1" strike="noStrike">
                 <a:solidFill>
@@ -7830,6 +8079,7 @@
                   </a:solidFill>
                 </a:uFill>
                 <a:latin typeface="Arial"/>
+                <a:ea typeface="DejaVu Sans"/>
               </a:rPr>
               <a:t>google</a:t>
             </a:r>
@@ -7856,7 +8106,7 @@
         <p:spPr>
           <a:xfrm>
             <a:off x="6583680" y="3931920"/>
-            <a:ext cx="1280160" cy="365760"/>
+            <a:ext cx="1279440" cy="365040"/>
           </a:xfrm>
           <a:prstGeom prst="rect">
             <a:avLst/>
@@ -7879,7 +8129,11 @@
         <p:txBody>
           <a:bodyPr wrap="none" lIns="90000" rIns="90000" tIns="45000" bIns="45000" anchor="ctr"/>
           <a:p>
-            <a:pPr algn="ctr"/>
+            <a:pPr algn="ctr">
+              <a:lnSpc>
+                <a:spcPct val="100000"/>
+              </a:lnSpc>
+            </a:pPr>
             <a:r>
               <a:rPr b="0" lang="en-US" sz="1800" spc="-1" strike="noStrike">
                 <a:solidFill>
@@ -7891,6 +8145,7 @@
                   </a:solidFill>
                 </a:uFill>
                 <a:latin typeface="Arial"/>
+                <a:ea typeface="DejaVu Sans"/>
               </a:rPr>
               <a:t>user1</a:t>
             </a:r>
@@ -7917,7 +8172,7 @@
         <p:spPr>
           <a:xfrm>
             <a:off x="7863840" y="3931920"/>
-            <a:ext cx="1280160" cy="365760"/>
+            <a:ext cx="1279440" cy="365040"/>
           </a:xfrm>
           <a:prstGeom prst="rect">
             <a:avLst/>
@@ -7940,7 +8195,11 @@
         <p:txBody>
           <a:bodyPr wrap="none" lIns="90000" rIns="90000" tIns="45000" bIns="45000" anchor="ctr"/>
           <a:p>
-            <a:pPr algn="ctr"/>
+            <a:pPr algn="ctr">
+              <a:lnSpc>
+                <a:spcPct val="100000"/>
+              </a:lnSpc>
+            </a:pPr>
             <a:r>
               <a:rPr b="0" lang="en-US" sz="1800" spc="-1" strike="noStrike">
                 <a:solidFill>
@@ -7952,6 +8211,7 @@
                   </a:solidFill>
                 </a:uFill>
                 <a:latin typeface="Arial"/>
+                <a:ea typeface="DejaVu Sans"/>
               </a:rPr>
               <a:t>bob</a:t>
             </a:r>
@@ -7978,7 +8238,7 @@
         <p:spPr>
           <a:xfrm>
             <a:off x="6583680" y="3566160"/>
-            <a:ext cx="1280160" cy="365760"/>
+            <a:ext cx="1279440" cy="365040"/>
           </a:xfrm>
           <a:prstGeom prst="rect">
             <a:avLst/>
@@ -8001,7 +8261,11 @@
         <p:txBody>
           <a:bodyPr wrap="none" lIns="90000" rIns="90000" tIns="45000" bIns="45000" anchor="ctr"/>
           <a:p>
-            <a:pPr algn="ctr"/>
+            <a:pPr algn="ctr">
+              <a:lnSpc>
+                <a:spcPct val="100000"/>
+              </a:lnSpc>
+            </a:pPr>
             <a:r>
               <a:rPr b="0" lang="en-US" sz="1800" spc="-1" strike="noStrike">
                 <a:solidFill>
@@ -8013,6 +8277,7 @@
                   </a:solidFill>
                 </a:uFill>
                 <a:latin typeface="Arial"/>
+                <a:ea typeface="DejaVu Sans"/>
               </a:rPr>
               <a:t>label1</a:t>
             </a:r>
@@ -8039,7 +8304,7 @@
         <p:spPr>
           <a:xfrm>
             <a:off x="7863840" y="3566160"/>
-            <a:ext cx="1280160" cy="365760"/>
+            <a:ext cx="1279440" cy="365040"/>
           </a:xfrm>
           <a:prstGeom prst="rect">
             <a:avLst/>
@@ -8062,7 +8327,11 @@
         <p:txBody>
           <a:bodyPr wrap="none" lIns="90000" rIns="90000" tIns="45000" bIns="45000" anchor="ctr"/>
           <a:p>
-            <a:pPr algn="ctr"/>
+            <a:pPr algn="ctr">
+              <a:lnSpc>
+                <a:spcPct val="100000"/>
+              </a:lnSpc>
+            </a:pPr>
             <a:r>
               <a:rPr b="0" lang="en-US" sz="1800" spc="-1" strike="noStrike">
                 <a:solidFill>
@@ -8074,6 +8343,7 @@
                   </a:solidFill>
                 </a:uFill>
                 <a:latin typeface="Arial"/>
+                <a:ea typeface="DejaVu Sans"/>
               </a:rPr>
               <a:t>facebook</a:t>
             </a:r>
@@ -8100,7 +8370,7 @@
         <p:spPr>
           <a:xfrm>
             <a:off x="6583680" y="4297680"/>
-            <a:ext cx="1280160" cy="365760"/>
+            <a:ext cx="1279440" cy="365040"/>
           </a:xfrm>
           <a:prstGeom prst="rect">
             <a:avLst/>
@@ -8123,7 +8393,11 @@
         <p:txBody>
           <a:bodyPr wrap="none" lIns="90000" rIns="90000" tIns="45000" bIns="45000" anchor="ctr"/>
           <a:p>
-            <a:pPr algn="ctr"/>
+            <a:pPr algn="ctr">
+              <a:lnSpc>
+                <a:spcPct val="100000"/>
+              </a:lnSpc>
+            </a:pPr>
             <a:r>
               <a:rPr b="0" lang="en-US" sz="1800" spc="-1" strike="noStrike">
                 <a:solidFill>
@@ -8135,6 +8409,7 @@
                   </a:solidFill>
                 </a:uFill>
                 <a:latin typeface="Arial"/>
+                <a:ea typeface="DejaVu Sans"/>
               </a:rPr>
               <a:t>pass1</a:t>
             </a:r>
@@ -8161,7 +8436,7 @@
         <p:spPr>
           <a:xfrm>
             <a:off x="7863840" y="4297680"/>
-            <a:ext cx="1280160" cy="365760"/>
+            <a:ext cx="1279440" cy="365040"/>
           </a:xfrm>
           <a:prstGeom prst="rect">
             <a:avLst/>
@@ -8184,7 +8459,11 @@
         <p:txBody>
           <a:bodyPr wrap="none" lIns="90000" rIns="90000" tIns="45000" bIns="45000" anchor="ctr"/>
           <a:p>
-            <a:pPr algn="ctr"/>
+            <a:pPr algn="ctr">
+              <a:lnSpc>
+                <a:spcPct val="100000"/>
+              </a:lnSpc>
+            </a:pPr>
             <a:r>
               <a:rPr b="0" lang="en-US" sz="1800" spc="-1" strike="noStrike">
                 <a:solidFill>
@@ -8196,6 +8475,7 @@
                   </a:solidFill>
                 </a:uFill>
                 <a:latin typeface="Arial"/>
+                <a:ea typeface="DejaVu Sans"/>
               </a:rPr>
               <a:t>pass123</a:t>
             </a:r>
@@ -8222,7 +8502,7 @@
         <p:spPr>
           <a:xfrm>
             <a:off x="6583680" y="4663440"/>
-            <a:ext cx="1280160" cy="365760"/>
+            <a:ext cx="1279440" cy="365040"/>
           </a:xfrm>
           <a:prstGeom prst="rect">
             <a:avLst/>
@@ -8245,7 +8525,11 @@
         <p:txBody>
           <a:bodyPr wrap="none" lIns="90000" rIns="90000" tIns="45000" bIns="45000" anchor="ctr"/>
           <a:p>
-            <a:pPr algn="ctr"/>
+            <a:pPr algn="ctr">
+              <a:lnSpc>
+                <a:spcPct val="100000"/>
+              </a:lnSpc>
+            </a:pPr>
             <a:r>
               <a:rPr b="0" lang="en-US" sz="1800" spc="-1" strike="noStrike">
                 <a:solidFill>
@@ -8257,6 +8541,7 @@
                   </a:solidFill>
                 </a:uFill>
                 <a:latin typeface="Arial"/>
+                <a:ea typeface="DejaVu Sans"/>
               </a:rPr>
               <a:t>nextEnt1</a:t>
             </a:r>
@@ -8283,7 +8568,7 @@
         <p:spPr>
           <a:xfrm>
             <a:off x="7863840" y="4663440"/>
-            <a:ext cx="1280160" cy="365760"/>
+            <a:ext cx="1279440" cy="365040"/>
           </a:xfrm>
           <a:prstGeom prst="rect">
             <a:avLst/>
@@ -8306,7 +8591,11 @@
         <p:txBody>
           <a:bodyPr wrap="none" lIns="90000" rIns="90000" tIns="45000" bIns="45000" anchor="ctr"/>
           <a:p>
-            <a:pPr algn="ctr"/>
+            <a:pPr algn="ctr">
+              <a:lnSpc>
+                <a:spcPct val="100000"/>
+              </a:lnSpc>
+            </a:pPr>
             <a:r>
               <a:rPr b="0" lang="en-US" sz="1800" spc="-1" strike="noStrike">
                 <a:solidFill>
@@ -8318,6 +8607,7 @@
                   </a:solidFill>
                 </a:uFill>
                 <a:latin typeface="Arial"/>
+                <a:ea typeface="DejaVu Sans"/>
               </a:rPr>
               <a:t>2</a:t>
             </a:r>
@@ -8344,7 +8634,7 @@
         <p:spPr>
           <a:xfrm>
             <a:off x="6583680" y="5029200"/>
-            <a:ext cx="1280160" cy="365760"/>
+            <a:ext cx="1279440" cy="365040"/>
           </a:xfrm>
           <a:prstGeom prst="rect">
             <a:avLst/>
@@ -8367,7 +8657,11 @@
         <p:txBody>
           <a:bodyPr wrap="none" lIns="90000" rIns="90000" tIns="45000" bIns="45000" anchor="ctr"/>
           <a:p>
-            <a:pPr algn="ctr"/>
+            <a:pPr algn="ctr">
+              <a:lnSpc>
+                <a:spcPct val="100000"/>
+              </a:lnSpc>
+            </a:pPr>
             <a:r>
               <a:rPr b="0" lang="en-US" sz="1800" spc="-1" strike="noStrike">
                 <a:solidFill>
@@ -8379,6 +8673,7 @@
                   </a:solidFill>
                 </a:uFill>
                 <a:latin typeface="Arial"/>
+                <a:ea typeface="DejaVu Sans"/>
               </a:rPr>
               <a:t>prevEnt1</a:t>
             </a:r>
@@ -8405,7 +8700,7 @@
         <p:spPr>
           <a:xfrm>
             <a:off x="7863840" y="5029200"/>
-            <a:ext cx="1280160" cy="365760"/>
+            <a:ext cx="1279440" cy="365040"/>
           </a:xfrm>
           <a:prstGeom prst="rect">
             <a:avLst/>
@@ -8428,7 +8723,11 @@
         <p:txBody>
           <a:bodyPr wrap="none" lIns="90000" rIns="90000" tIns="45000" bIns="45000" anchor="ctr"/>
           <a:p>
-            <a:pPr algn="ctr"/>
+            <a:pPr algn="ctr">
+              <a:lnSpc>
+                <a:spcPct val="100000"/>
+              </a:lnSpc>
+            </a:pPr>
             <a:r>
               <a:rPr b="0" lang="en-US" sz="1800" spc="-1" strike="noStrike">
                 <a:solidFill>
@@ -8440,6 +8739,7 @@
                   </a:solidFill>
                 </a:uFill>
                 <a:latin typeface="Arial"/>
+                <a:ea typeface="DejaVu Sans"/>
               </a:rPr>
               <a:t>1</a:t>
             </a:r>

</xml_diff>